<commit_message>
Added software block diagram
</commit_message>
<xml_diff>
--- a/project_01/docs/Loh_EDES301_project_01_proposal.pptx
+++ b/project_01/docs/Loh_EDES301_project_01_proposal.pptx
@@ -5,17 +5,18 @@
     <p:sldMasterId id="2147483648" r:id="rId1"/>
   </p:sldMasterIdLst>
   <p:notesMasterIdLst>
-    <p:notesMasterId r:id="rId7"/>
+    <p:notesMasterId r:id="rId8"/>
   </p:notesMasterIdLst>
   <p:handoutMasterIdLst>
-    <p:handoutMasterId r:id="rId8"/>
+    <p:handoutMasterId r:id="rId9"/>
   </p:handoutMasterIdLst>
   <p:sldIdLst>
     <p:sldId id="261" r:id="rId2"/>
     <p:sldId id="367" r:id="rId3"/>
     <p:sldId id="368" r:id="rId4"/>
     <p:sldId id="370" r:id="rId5"/>
-    <p:sldId id="369" r:id="rId6"/>
+    <p:sldId id="371" r:id="rId6"/>
+    <p:sldId id="369" r:id="rId7"/>
   </p:sldIdLst>
   <p:sldSz cx="12192000" cy="6858000"/>
   <p:notesSz cx="6858000" cy="9144000"/>
@@ -139,7 +140,7 @@
 <file path=ppt/revisionInfo.xml><?xml version="1.0" encoding="utf-8"?>
 <p1510:revInfo xmlns:a="http://schemas.openxmlformats.org/drawingml/2006/main" xmlns:r="http://schemas.openxmlformats.org/officeDocument/2006/relationships" xmlns:p1510="http://schemas.microsoft.com/office/powerpoint/2015/10/main">
   <p1510:revLst>
-    <p1510:client id="{77741828-E45C-4367-BFDC-74B0550579FC}" v="13" dt="2025-02-28T23:35:39.672"/>
+    <p1510:client id="{77741828-E45C-4367-BFDC-74B0550579FC}" v="14" dt="2025-03-08T02:22:10.483"/>
   </p1510:revLst>
 </p1510:revInfo>
 </file>
@@ -148,8 +149,8 @@
 <pc:chgInfo xmlns:a="http://schemas.openxmlformats.org/drawingml/2006/main" xmlns:r="http://schemas.openxmlformats.org/officeDocument/2006/relationships" xmlns:ac="http://schemas.microsoft.com/office/drawing/2013/main/command" xmlns:pc="http://schemas.microsoft.com/office/powerpoint/2013/main/command">
   <pc:docChgLst>
     <pc:chgData name="Sophianne Loh" userId="8637b7878f47fa27" providerId="LiveId" clId="{77741828-E45C-4367-BFDC-74B0550579FC}"/>
-    <pc:docChg chg="undo custSel delSld modSld">
-      <pc:chgData name="Sophianne Loh" userId="8637b7878f47fa27" providerId="LiveId" clId="{77741828-E45C-4367-BFDC-74B0550579FC}" dt="2025-02-28T23:36:21.296" v="1571" actId="20577"/>
+    <pc:docChg chg="undo custSel addSld delSld modSld">
+      <pc:chgData name="Sophianne Loh" userId="8637b7878f47fa27" providerId="LiveId" clId="{77741828-E45C-4367-BFDC-74B0550579FC}" dt="2025-03-08T02:22:10.894" v="1584" actId="962"/>
       <pc:docMkLst>
         <pc:docMk/>
       </pc:docMkLst>
@@ -205,14 +206,6 @@
             <ac:picMk id="3" creationId="{A18E8BEA-A6D1-9FC2-2849-241EE1F0462A}"/>
           </ac:picMkLst>
         </pc:picChg>
-        <pc:picChg chg="add del mod">
-          <ac:chgData name="Sophianne Loh" userId="8637b7878f47fa27" providerId="LiveId" clId="{77741828-E45C-4367-BFDC-74B0550579FC}" dt="2025-02-28T23:35:37.659" v="1424" actId="478"/>
-          <ac:picMkLst>
-            <pc:docMk/>
-            <pc:sldMk cId="140782560" sldId="368"/>
-            <ac:picMk id="5" creationId="{888380F8-8988-F004-C5F3-15BA332C5399}"/>
-          </ac:picMkLst>
-        </pc:picChg>
       </pc:sldChg>
       <pc:sldChg chg="delSp modSp mod">
         <pc:chgData name="Sophianne Loh" userId="8637b7878f47fa27" providerId="LiveId" clId="{77741828-E45C-4367-BFDC-74B0550579FC}" dt="2025-02-28T23:20:41.705" v="1418" actId="1076"/>
@@ -251,12 +244,35 @@
             <ac:picMk id="3" creationId="{1F5ECDE0-E8CD-015B-D23F-FB86304C93C3}"/>
           </ac:picMkLst>
         </pc:picChg>
-        <pc:picChg chg="add del mod">
-          <ac:chgData name="Sophianne Loh" userId="8637b7878f47fa27" providerId="LiveId" clId="{77741828-E45C-4367-BFDC-74B0550579FC}" dt="2025-02-28T23:35:20.510" v="1419" actId="478"/>
+      </pc:sldChg>
+      <pc:sldChg chg="addSp delSp modSp add mod">
+        <pc:chgData name="Sophianne Loh" userId="8637b7878f47fa27" providerId="LiveId" clId="{77741828-E45C-4367-BFDC-74B0550579FC}" dt="2025-03-08T02:22:10.894" v="1584" actId="962"/>
+        <pc:sldMkLst>
+          <pc:docMk/>
+          <pc:sldMk cId="1521140893" sldId="371"/>
+        </pc:sldMkLst>
+        <pc:spChg chg="mod">
+          <ac:chgData name="Sophianne Loh" userId="8637b7878f47fa27" providerId="LiveId" clId="{77741828-E45C-4367-BFDC-74B0550579FC}" dt="2025-03-08T02:22:02.933" v="1580" actId="20577"/>
+          <ac:spMkLst>
+            <pc:docMk/>
+            <pc:sldMk cId="1521140893" sldId="371"/>
+            <ac:spMk id="2" creationId="{54D5D88E-C668-E386-6475-4AEAD7E4D6DE}"/>
+          </ac:spMkLst>
+        </pc:spChg>
+        <pc:picChg chg="del">
+          <ac:chgData name="Sophianne Loh" userId="8637b7878f47fa27" providerId="LiveId" clId="{77741828-E45C-4367-BFDC-74B0550579FC}" dt="2025-03-08T02:22:04.828" v="1581" actId="478"/>
           <ac:picMkLst>
             <pc:docMk/>
-            <pc:sldMk cId="4204615274" sldId="370"/>
-            <ac:picMk id="5" creationId="{49FAC44E-590C-1D68-EAF6-7F4011AAAD1A}"/>
+            <pc:sldMk cId="1521140893" sldId="371"/>
+            <ac:picMk id="3" creationId="{59E60BA6-D9C4-6F5A-516B-CEDF5D3147BA}"/>
+          </ac:picMkLst>
+        </pc:picChg>
+        <pc:picChg chg="add mod">
+          <ac:chgData name="Sophianne Loh" userId="8637b7878f47fa27" providerId="LiveId" clId="{77741828-E45C-4367-BFDC-74B0550579FC}" dt="2025-03-08T02:22:10.894" v="1584" actId="962"/>
+          <ac:picMkLst>
+            <pc:docMk/>
+            <pc:sldMk cId="1521140893" sldId="371"/>
+            <ac:picMk id="5" creationId="{F6F5FD03-4860-A454-91D3-200E45A9731E}"/>
           </ac:picMkLst>
         </pc:picChg>
       </pc:sldChg>
@@ -354,7 +370,7 @@
           <a:p>
             <a:fld id="{59041DB8-B66F-4DC8-A96E-33677E0F90FF}" type="datetimeFigureOut">
               <a:rPr lang="en-US" smtClean="0"/>
-              <a:t>2/28/2025</a:t>
+              <a:t>3/7/2025</a:t>
             </a:fld>
             <a:endParaRPr lang="en-US"/>
           </a:p>
@@ -519,7 +535,7 @@
           <a:p>
             <a:fld id="{DEB49C4A-65AC-492D-9701-81B46C3AD0E4}" type="datetimeFigureOut">
               <a:rPr lang="en-US" smtClean="0"/>
-              <a:t>2/28/2025</a:t>
+              <a:t>3/7/2025</a:t>
             </a:fld>
             <a:endParaRPr lang="en-US"/>
           </a:p>
@@ -2927,7 +2943,7 @@
           <a:p>
             <a:fld id="{384A29A4-78C8-47AB-BA06-22CB45938951}" type="datetime1">
               <a:rPr lang="en-US" smtClean="0"/>
-              <a:t>2/28/2025</a:t>
+              <a:t>3/7/2025</a:t>
             </a:fld>
             <a:endParaRPr lang="en-US"/>
           </a:p>
@@ -3122,7 +3138,7 @@
           <a:p>
             <a:fld id="{E1ED4ACF-2D82-46F2-A8E9-23963AA34E86}" type="datetime1">
               <a:rPr lang="en-US" smtClean="0"/>
-              <a:t>2/28/2025</a:t>
+              <a:t>3/7/2025</a:t>
             </a:fld>
             <a:endParaRPr lang="en-US"/>
           </a:p>
@@ -3316,7 +3332,7 @@
           <a:p>
             <a:fld id="{AE374B5B-21A0-4192-BF4C-38187F1A68D8}" type="datetime1">
               <a:rPr lang="en-US" smtClean="0"/>
-              <a:t>2/28/2025</a:t>
+              <a:t>3/7/2025</a:t>
             </a:fld>
             <a:endParaRPr lang="en-US"/>
           </a:p>
@@ -5657,7 +5673,7 @@
           <a:p>
             <a:fld id="{33B5CF7C-B333-48E1-A4A6-83A3C8B73AC0}" type="datetime1">
               <a:rPr lang="en-US" smtClean="0"/>
-              <a:t>2/28/2025</a:t>
+              <a:t>3/7/2025</a:t>
             </a:fld>
             <a:endParaRPr lang="en-US"/>
           </a:p>
@@ -6110,7 +6126,7 @@
           <a:p>
             <a:fld id="{AE320762-5CBF-4210-AB54-376B091119F8}" type="datetime1">
               <a:rPr lang="en-US" smtClean="0"/>
-              <a:t>2/28/2025</a:t>
+              <a:t>3/7/2025</a:t>
             </a:fld>
             <a:endParaRPr lang="en-US"/>
           </a:p>
@@ -6242,7 +6258,7 @@
           <a:p>
             <a:fld id="{7F0DB371-BF5F-4058-A212-1A908E4D2674}" type="datetime1">
               <a:rPr lang="en-US" smtClean="0"/>
-              <a:t>2/28/2025</a:t>
+              <a:t>3/7/2025</a:t>
             </a:fld>
             <a:endParaRPr lang="en-US"/>
           </a:p>
@@ -8175,7 +8191,7 @@
           <a:p>
             <a:fld id="{60A4083B-90AA-48CF-BAD5-00AA24D7F288}" type="datetime1">
               <a:rPr lang="en-US" smtClean="0"/>
-              <a:t>2/28/2025</a:t>
+              <a:t>3/7/2025</a:t>
             </a:fld>
             <a:endParaRPr lang="en-US"/>
           </a:p>
@@ -10434,7 +10450,7 @@
             <a:fld id="{F5BAF629-ECA2-4CF3-B790-9D9BDED98269}" type="datetime1">
               <a:rPr lang="en-US" smtClean="0"/>
               <a:pPr/>
-              <a:t>2/28/2025</a:t>
+              <a:t>3/7/2025</a:t>
             </a:fld>
             <a:endParaRPr lang="en-US"/>
           </a:p>
@@ -14729,7 +14745,7 @@
             <a:fld id="{B51B2453-8663-4C69-AF73-9FD7B1DEC5D0}" type="datetime1">
               <a:rPr lang="en-US" smtClean="0"/>
               <a:pPr/>
-              <a:t>2/28/2025</a:t>
+              <a:t>3/7/2025</a:t>
             </a:fld>
             <a:endParaRPr lang="en-US" dirty="0"/>
           </a:p>
@@ -15678,6 +15694,112 @@
 </file>
 
 <file path=ppt/slides/slide5.xml><?xml version="1.0" encoding="utf-8"?>
+<p:sld xmlns:a="http://schemas.openxmlformats.org/drawingml/2006/main" xmlns:r="http://schemas.openxmlformats.org/officeDocument/2006/relationships" xmlns:p="http://schemas.openxmlformats.org/presentationml/2006/main">
+  <p:cSld>
+    <p:spTree>
+      <p:nvGrpSpPr>
+        <p:cNvPr id="1" name="">
+          <a:extLst>
+            <a:ext uri="{FF2B5EF4-FFF2-40B4-BE49-F238E27FC236}">
+              <a16:creationId xmlns:a16="http://schemas.microsoft.com/office/drawing/2014/main" id="{78A4D9FA-28AE-28D6-5975-899A76B88BBD}"/>
+            </a:ext>
+          </a:extLst>
+        </p:cNvPr>
+        <p:cNvGrpSpPr/>
+        <p:nvPr/>
+      </p:nvGrpSpPr>
+      <p:grpSpPr>
+        <a:xfrm>
+          <a:off x="0" y="0"/>
+          <a:ext cx="0" cy="0"/>
+          <a:chOff x="0" y="0"/>
+          <a:chExt cx="0" cy="0"/>
+        </a:xfrm>
+      </p:grpSpPr>
+      <p:sp>
+        <p:nvSpPr>
+          <p:cNvPr id="2" name="Title 1">
+            <a:extLst>
+              <a:ext uri="{FF2B5EF4-FFF2-40B4-BE49-F238E27FC236}">
+                <a16:creationId xmlns:a16="http://schemas.microsoft.com/office/drawing/2014/main" id="{54D5D88E-C668-E386-6475-4AEAD7E4D6DE}"/>
+              </a:ext>
+            </a:extLst>
+          </p:cNvPr>
+          <p:cNvSpPr>
+            <a:spLocks noGrp="1"/>
+          </p:cNvSpPr>
+          <p:nvPr>
+            <p:ph type="title"/>
+          </p:nvPr>
+        </p:nvSpPr>
+        <p:spPr/>
+        <p:txBody>
+          <a:bodyPr/>
+          <a:lstStyle/>
+          <a:p>
+            <a:r>
+              <a:rPr lang="en-US" dirty="0"/>
+              <a:t>Software Block Diagram</a:t>
+            </a:r>
+          </a:p>
+        </p:txBody>
+      </p:sp>
+      <p:pic>
+        <p:nvPicPr>
+          <p:cNvPr id="5" name="Picture 4" descr="A diagram of a light sensor&#10;&#10;AI-generated content may be incorrect.">
+            <a:extLst>
+              <a:ext uri="{FF2B5EF4-FFF2-40B4-BE49-F238E27FC236}">
+                <a16:creationId xmlns:a16="http://schemas.microsoft.com/office/drawing/2014/main" id="{F6F5FD03-4860-A454-91D3-200E45A9731E}"/>
+              </a:ext>
+            </a:extLst>
+          </p:cNvPr>
+          <p:cNvPicPr>
+            <a:picLocks noChangeAspect="1"/>
+          </p:cNvPicPr>
+          <p:nvPr/>
+        </p:nvPicPr>
+        <p:blipFill>
+          <a:blip r:embed="rId2"/>
+          <a:stretch>
+            <a:fillRect/>
+          </a:stretch>
+        </p:blipFill>
+        <p:spPr>
+          <a:xfrm>
+            <a:off x="2390775" y="1447800"/>
+            <a:ext cx="7410450" cy="3962400"/>
+          </a:xfrm>
+          <a:prstGeom prst="rect">
+            <a:avLst/>
+          </a:prstGeom>
+        </p:spPr>
+      </p:pic>
+    </p:spTree>
+    <p:extLst>
+      <p:ext uri="{BB962C8B-B14F-4D97-AF65-F5344CB8AC3E}">
+        <p14:creationId xmlns:p14="http://schemas.microsoft.com/office/powerpoint/2010/main" val="1521140893"/>
+      </p:ext>
+    </p:extLst>
+  </p:cSld>
+  <p:clrMapOvr>
+    <a:masterClrMapping/>
+  </p:clrMapOvr>
+  <mc:AlternateContent xmlns:mc="http://schemas.openxmlformats.org/markup-compatibility/2006">
+    <mc:Choice xmlns:p14="http://schemas.microsoft.com/office/powerpoint/2010/main" Requires="p14">
+      <p:transition spd="med" p14:dur="700">
+        <p:fade/>
+      </p:transition>
+    </mc:Choice>
+    <mc:Fallback>
+      <p:transition spd="med">
+        <p:fade/>
+      </p:transition>
+    </mc:Fallback>
+  </mc:AlternateContent>
+</p:sld>
+</file>
+
+<file path=ppt/slides/slide6.xml><?xml version="1.0" encoding="utf-8"?>
 <p:sld xmlns:a="http://schemas.openxmlformats.org/drawingml/2006/main" xmlns:r="http://schemas.openxmlformats.org/officeDocument/2006/relationships" xmlns:p="http://schemas.openxmlformats.org/presentationml/2006/main">
   <p:cSld>
     <p:spTree>

</xml_diff>